<commit_message>
Settle bahagian UI & intro to activities
Settle bahagian UI & intro to activities
</commit_message>
<xml_diff>
--- a/presentation/intro to android.pptx
+++ b/presentation/intro to android.pptx
@@ -111,6 +111,11 @@
       </a:defRPr>
     </a:lvl9pPr>
   </p:defaultTextStyle>
+  <p:extLst>
+    <p:ext uri="{EFAFB233-063F-42B5-8137-9DF3F51BA10A}">
+      <p15:sldGuideLst xmlns:p15="http://schemas.microsoft.com/office/powerpoint/2012/main"/>
+    </p:ext>
+  </p:extLst>
 </p:presentation>
 </file>
 
@@ -836,7 +841,7 @@
           <a:p>
             <a:fld id="{6602C0D2-A336-4E06-9C92-574E03A26D94}" type="datetimeFigureOut">
               <a:rPr lang="en-US" smtClean="0"/>
-              <a:t>10/19/2017</a:t>
+              <a:t>10/20/2017</a:t>
             </a:fld>
             <a:endParaRPr lang="en-US"/>
           </a:p>
@@ -1087,7 +1092,7 @@
           <a:p>
             <a:fld id="{6602C0D2-A336-4E06-9C92-574E03A26D94}" type="datetimeFigureOut">
               <a:rPr lang="en-US" smtClean="0"/>
-              <a:t>10/19/2017</a:t>
+              <a:t>10/20/2017</a:t>
             </a:fld>
             <a:endParaRPr lang="en-US"/>
           </a:p>
@@ -1401,7 +1406,7 @@
           <a:p>
             <a:fld id="{6602C0D2-A336-4E06-9C92-574E03A26D94}" type="datetimeFigureOut">
               <a:rPr lang="en-US" smtClean="0"/>
-              <a:t>10/19/2017</a:t>
+              <a:t>10/20/2017</a:t>
             </a:fld>
             <a:endParaRPr lang="en-US"/>
           </a:p>
@@ -1742,7 +1747,7 @@
           <a:p>
             <a:fld id="{6602C0D2-A336-4E06-9C92-574E03A26D94}" type="datetimeFigureOut">
               <a:rPr lang="en-US" smtClean="0"/>
-              <a:t>10/19/2017</a:t>
+              <a:t>10/20/2017</a:t>
             </a:fld>
             <a:endParaRPr lang="en-US"/>
           </a:p>
@@ -2056,7 +2061,7 @@
           <a:p>
             <a:fld id="{6602C0D2-A336-4E06-9C92-574E03A26D94}" type="datetimeFigureOut">
               <a:rPr lang="en-US" smtClean="0"/>
-              <a:t>10/19/2017</a:t>
+              <a:t>10/20/2017</a:t>
             </a:fld>
             <a:endParaRPr lang="en-US"/>
           </a:p>
@@ -2449,7 +2454,7 @@
           <a:p>
             <a:fld id="{6602C0D2-A336-4E06-9C92-574E03A26D94}" type="datetimeFigureOut">
               <a:rPr lang="en-US" smtClean="0"/>
-              <a:t>10/19/2017</a:t>
+              <a:t>10/20/2017</a:t>
             </a:fld>
             <a:endParaRPr lang="en-US"/>
           </a:p>
@@ -2619,7 +2624,7 @@
           <a:p>
             <a:fld id="{6602C0D2-A336-4E06-9C92-574E03A26D94}" type="datetimeFigureOut">
               <a:rPr lang="en-US" smtClean="0"/>
-              <a:t>10/19/2017</a:t>
+              <a:t>10/20/2017</a:t>
             </a:fld>
             <a:endParaRPr lang="en-US"/>
           </a:p>
@@ -2799,7 +2804,7 @@
           <a:p>
             <a:fld id="{6602C0D2-A336-4E06-9C92-574E03A26D94}" type="datetimeFigureOut">
               <a:rPr lang="en-US" smtClean="0"/>
-              <a:t>10/19/2017</a:t>
+              <a:t>10/20/2017</a:t>
             </a:fld>
             <a:endParaRPr lang="en-US"/>
           </a:p>
@@ -2975,7 +2980,7 @@
           <a:p>
             <a:fld id="{6602C0D2-A336-4E06-9C92-574E03A26D94}" type="datetimeFigureOut">
               <a:rPr lang="en-US" smtClean="0"/>
-              <a:t>10/19/2017</a:t>
+              <a:t>10/20/2017</a:t>
             </a:fld>
             <a:endParaRPr lang="en-US"/>
           </a:p>
@@ -3222,7 +3227,7 @@
           <a:p>
             <a:fld id="{6602C0D2-A336-4E06-9C92-574E03A26D94}" type="datetimeFigureOut">
               <a:rPr lang="en-US" smtClean="0"/>
-              <a:t>10/19/2017</a:t>
+              <a:t>10/20/2017</a:t>
             </a:fld>
             <a:endParaRPr lang="en-US"/>
           </a:p>
@@ -3454,7 +3459,7 @@
           <a:p>
             <a:fld id="{6602C0D2-A336-4E06-9C92-574E03A26D94}" type="datetimeFigureOut">
               <a:rPr lang="en-US" smtClean="0"/>
-              <a:t>10/19/2017</a:t>
+              <a:t>10/20/2017</a:t>
             </a:fld>
             <a:endParaRPr lang="en-US"/>
           </a:p>
@@ -3828,7 +3833,7 @@
           <a:p>
             <a:fld id="{6602C0D2-A336-4E06-9C92-574E03A26D94}" type="datetimeFigureOut">
               <a:rPr lang="en-US" smtClean="0"/>
-              <a:t>10/19/2017</a:t>
+              <a:t>10/20/2017</a:t>
             </a:fld>
             <a:endParaRPr lang="en-US"/>
           </a:p>
@@ -3951,7 +3956,7 @@
           <a:p>
             <a:fld id="{6602C0D2-A336-4E06-9C92-574E03A26D94}" type="datetimeFigureOut">
               <a:rPr lang="en-US" smtClean="0"/>
-              <a:t>10/19/2017</a:t>
+              <a:t>10/20/2017</a:t>
             </a:fld>
             <a:endParaRPr lang="en-US"/>
           </a:p>
@@ -4046,7 +4051,7 @@
           <a:p>
             <a:fld id="{6602C0D2-A336-4E06-9C92-574E03A26D94}" type="datetimeFigureOut">
               <a:rPr lang="en-US" smtClean="0"/>
-              <a:t>10/19/2017</a:t>
+              <a:t>10/20/2017</a:t>
             </a:fld>
             <a:endParaRPr lang="en-US"/>
           </a:p>
@@ -4301,7 +4306,7 @@
           <a:p>
             <a:fld id="{6602C0D2-A336-4E06-9C92-574E03A26D94}" type="datetimeFigureOut">
               <a:rPr lang="en-US" smtClean="0"/>
-              <a:t>10/19/2017</a:t>
+              <a:t>10/20/2017</a:t>
             </a:fld>
             <a:endParaRPr lang="en-US"/>
           </a:p>
@@ -4564,7 +4569,7 @@
           <a:p>
             <a:fld id="{6602C0D2-A336-4E06-9C92-574E03A26D94}" type="datetimeFigureOut">
               <a:rPr lang="en-US" smtClean="0"/>
-              <a:t>10/19/2017</a:t>
+              <a:t>10/20/2017</a:t>
             </a:fld>
             <a:endParaRPr lang="en-US"/>
           </a:p>
@@ -5307,7 +5312,7 @@
           <a:p>
             <a:fld id="{6602C0D2-A336-4E06-9C92-574E03A26D94}" type="datetimeFigureOut">
               <a:rPr lang="en-US" smtClean="0"/>
-              <a:t>10/19/2017</a:t>
+              <a:t>10/20/2017</a:t>
             </a:fld>
             <a:endParaRPr lang="en-US"/>
           </a:p>
@@ -6033,11 +6038,7 @@
           <a:p>
             <a:r>
               <a:rPr lang="en-US" dirty="0" smtClean="0"/>
-              <a:t>OS = Android (</a:t>
-            </a:r>
-            <a:r>
-              <a:rPr lang="en-US" dirty="0" smtClean="0"/>
-              <a:t>based on Linux Kernel)</a:t>
+              <a:t>OS = Android (based on Linux Kernel)</a:t>
             </a:r>
           </a:p>
           <a:p>
@@ -6086,7 +6087,6 @@
               <a:rPr lang="en-US" dirty="0" smtClean="0"/>
               <a:t>GPS</a:t>
             </a:r>
-            <a:endParaRPr lang="en-US" dirty="0" smtClean="0"/>
           </a:p>
           <a:p>
             <a:r>
@@ -6485,13 +6485,15 @@
               <a:rPr lang="en-US" dirty="0" smtClean="0"/>
               <a:t>Resources</a:t>
             </a:r>
+            <a:endParaRPr lang="en-US" dirty="0" smtClean="0"/>
           </a:p>
           <a:p>
             <a:pPr lvl="1"/>
             <a:r>
               <a:rPr lang="en-US" dirty="0" smtClean="0"/>
-              <a:t>Layout</a:t>
-            </a:r>
+              <a:t>Layout (front-end)</a:t>
+            </a:r>
+            <a:endParaRPr lang="en-US" dirty="0" smtClean="0"/>
           </a:p>
           <a:p>
             <a:pPr lvl="1"/>
@@ -6502,9 +6504,18 @@
           </a:p>
           <a:p>
             <a:r>
+              <a:rPr lang="en-US"/>
+              <a:t>Components </a:t>
+            </a:r>
+            <a:r>
+              <a:rPr lang="en-US" smtClean="0"/>
+              <a:t>(back-end</a:t>
+            </a:r>
+            <a:r>
               <a:rPr lang="en-US" dirty="0" smtClean="0"/>
-              <a:t>Components</a:t>
-            </a:r>
+              <a:t>)</a:t>
+            </a:r>
+            <a:endParaRPr lang="en-US" dirty="0" smtClean="0"/>
           </a:p>
           <a:p>
             <a:pPr lvl="1"/>

</xml_diff>